<commit_message>
Cleaned up the presentation and notebook
</commit_message>
<xml_diff>
--- a/P4_02_Presentation.pptx
+++ b/P4_02_Presentation.pptx
@@ -21,8 +21,8 @@
     <p:sldId id="311" r:id="rId12"/>
     <p:sldId id="301" r:id="rId13"/>
     <p:sldId id="338" r:id="rId14"/>
-    <p:sldId id="348" r:id="rId15"/>
-    <p:sldId id="335" r:id="rId16"/>
+    <p:sldId id="335" r:id="rId15"/>
+    <p:sldId id="348" r:id="rId16"/>
     <p:sldId id="313" r:id="rId17"/>
     <p:sldId id="331" r:id="rId18"/>
     <p:sldId id="328" r:id="rId19"/>
@@ -911,7 +911,7 @@
     </p:spTree>
     <p:extLst>
       <p:ext uri="{BB962C8B-B14F-4D97-AF65-F5344CB8AC3E}">
-        <p14:creationId xmlns:p14="http://schemas.microsoft.com/office/powerpoint/2010/main" val="2461381688"/>
+        <p14:creationId xmlns:p14="http://schemas.microsoft.com/office/powerpoint/2010/main" val="1265771282"/>
       </p:ext>
     </p:extLst>
   </p:cSld>
@@ -977,7 +977,7 @@
     </p:spTree>
     <p:extLst>
       <p:ext uri="{BB962C8B-B14F-4D97-AF65-F5344CB8AC3E}">
-        <p14:creationId xmlns:p14="http://schemas.microsoft.com/office/powerpoint/2010/main" val="1265771282"/>
+        <p14:creationId xmlns:p14="http://schemas.microsoft.com/office/powerpoint/2010/main" val="2461381688"/>
       </p:ext>
     </p:extLst>
   </p:cSld>
@@ -1080,7 +1080,12 @@
             <p:ph type="sldImg"/>
           </p:nvPr>
         </p:nvSpPr>
-        <p:spPr/>
+        <p:spPr>
+          <a:xfrm>
+            <a:off x="381000" y="685800"/>
+            <a:ext cx="6096000" cy="3429000"/>
+          </a:xfrm>
+        </p:spPr>
       </p:sp>
       <p:sp>
         <p:nvSpPr>
@@ -16240,7 +16245,7 @@
                   <a:schemeClr val="tx1"/>
                 </a:solidFill>
               </a:rPr>
-              <a:t>of the 3 models using Bayesian Search</a:t>
+              <a:t>of the 3 models using an optimized search algorithm (Bayesian Search)</a:t>
             </a:r>
           </a:p>
           <a:p>
@@ -16300,7 +16305,7 @@
                 </a:solidFill>
                 <a:sym typeface="Wingdings" panose="05000000000000000000" pitchFamily="2" charset="2"/>
               </a:rPr>
-              <a:t> Choose best performing model</a:t>
+              <a:t> Ridge Classifier has the best performance and will be chosen for our model</a:t>
             </a:r>
             <a:endParaRPr lang="en-US" sz="1400" b="1" dirty="0">
               <a:solidFill>
@@ -16352,6 +16357,58 @@
           </a:p>
         </p:txBody>
       </p:sp>
+      <p:pic>
+        <p:nvPicPr>
+          <p:cNvPr id="1026" name="Picture 2">
+            <a:extLst>
+              <a:ext uri="{FF2B5EF4-FFF2-40B4-BE49-F238E27FC236}">
+                <a16:creationId xmlns:a16="http://schemas.microsoft.com/office/drawing/2014/main" id="{D37418CC-1F65-970C-AE54-BA41A8CF1D85}"/>
+              </a:ext>
+            </a:extLst>
+          </p:cNvPr>
+          <p:cNvPicPr>
+            <a:picLocks noChangeAspect="1" noChangeArrowheads="1"/>
+          </p:cNvPicPr>
+          <p:nvPr/>
+        </p:nvPicPr>
+        <p:blipFill>
+          <a:blip r:embed="rId3">
+            <a:extLst>
+              <a:ext uri="{28A0092B-C50C-407E-A947-70E740481C1C}">
+                <a14:useLocalDpi xmlns:a14="http://schemas.microsoft.com/office/drawing/2010/main" val="0"/>
+              </a:ext>
+            </a:extLst>
+          </a:blip>
+          <a:srcRect/>
+          <a:stretch>
+            <a:fillRect/>
+          </a:stretch>
+        </p:blipFill>
+        <p:spPr bwMode="auto">
+          <a:xfrm>
+            <a:off x="4553602" y="602671"/>
+            <a:ext cx="4594514" cy="3938155"/>
+          </a:xfrm>
+          <a:prstGeom prst="rect">
+            <a:avLst/>
+          </a:prstGeom>
+          <a:noFill/>
+          <a:ln>
+            <a:solidFill>
+              <a:schemeClr val="tx1"/>
+            </a:solidFill>
+          </a:ln>
+          <a:extLst>
+            <a:ext uri="{909E8E84-426E-40DD-AFC4-6F175D3DCCD1}">
+              <a14:hiddenFill xmlns:a14="http://schemas.microsoft.com/office/drawing/2010/main">
+                <a:solidFill>
+                  <a:srgbClr val="FFFFFF"/>
+                </a:solidFill>
+              </a14:hiddenFill>
+            </a:ext>
+          </a:extLst>
+        </p:spPr>
+      </p:pic>
     </p:spTree>
     <p:extLst>
       <p:ext uri="{BB962C8B-B14F-4D97-AF65-F5344CB8AC3E}">
@@ -16400,8 +16457,8 @@
         </p:nvSpPr>
         <p:spPr>
           <a:xfrm>
-            <a:off x="0" y="661471"/>
-            <a:ext cx="4571999" cy="3820557"/>
+            <a:off x="0" y="722721"/>
+            <a:ext cx="4439473" cy="3820557"/>
           </a:xfrm>
         </p:spPr>
         <p:txBody>
@@ -16414,12 +16471,37 @@
               </a:lnSpc>
             </a:pPr>
             <a:r>
+              <a:rPr lang="en-US" sz="1400" dirty="0">
+                <a:solidFill>
+                  <a:schemeClr val="tx1"/>
+                </a:solidFill>
+              </a:rPr>
+              <a:t>To improve our model further :</a:t>
+            </a:r>
+          </a:p>
+          <a:p>
+            <a:pPr lvl="1">
+              <a:lnSpc>
+                <a:spcPct val="200000"/>
+              </a:lnSpc>
+              <a:buFont typeface="Wingdings" panose="05000000000000000000" pitchFamily="2" charset="2"/>
+              <a:buChar char="Ø"/>
+            </a:pPr>
+            <a:r>
+              <a:rPr lang="en-US" sz="1400" dirty="0">
+                <a:solidFill>
+                  <a:schemeClr val="tx1"/>
+                </a:solidFill>
+              </a:rPr>
+              <a:t>Selection of the most efficient scaler (</a:t>
+            </a:r>
+            <a:r>
               <a:rPr lang="en-US" sz="1400" b="1" dirty="0">
                 <a:solidFill>
                   <a:schemeClr val="tx1"/>
                 </a:solidFill>
               </a:rPr>
-              <a:t>Optimization of the parameters </a:t>
+              <a:t>Standard Scaler</a:t>
             </a:r>
             <a:r>
               <a:rPr lang="en-US" sz="1400" dirty="0">
@@ -16427,26 +16509,16 @@
                   <a:schemeClr val="tx1"/>
                 </a:solidFill>
               </a:rPr>
-              <a:t>of the 3 models using Bayesian Search</a:t>
+              <a:t>)</a:t>
             </a:r>
           </a:p>
           <a:p>
-            <a:pPr>
+            <a:pPr lvl="1">
               <a:lnSpc>
                 <a:spcPct val="200000"/>
               </a:lnSpc>
-            </a:pPr>
-            <a:endParaRPr lang="en-US" sz="1400" dirty="0">
-              <a:solidFill>
-                <a:schemeClr val="tx1"/>
-              </a:solidFill>
-            </a:endParaRPr>
-          </a:p>
-          <a:p>
-            <a:pPr>
-              <a:lnSpc>
-                <a:spcPct val="200000"/>
-              </a:lnSpc>
+              <a:buFont typeface="Wingdings" panose="05000000000000000000" pitchFamily="2" charset="2"/>
+              <a:buChar char="Ø"/>
             </a:pPr>
             <a:r>
               <a:rPr lang="en-US" sz="1400" dirty="0">
@@ -16454,15 +16526,32 @@
                   <a:schemeClr val="tx1"/>
                 </a:solidFill>
               </a:rPr>
-              <a:t>Compute ROC AUC (test) score on the 3 models</a:t>
+              <a:t> Identification of the best feature selection method (</a:t>
             </a:r>
-          </a:p>
-          <a:p>
-            <a:pPr marL="171450" indent="0">
+            <a:r>
+              <a:rPr lang="en-US" sz="1400" b="1" dirty="0">
+                <a:solidFill>
+                  <a:schemeClr val="tx1"/>
+                </a:solidFill>
+              </a:rPr>
+              <a:t>Boruta Algorithm</a:t>
+            </a:r>
+            <a:r>
+              <a:rPr lang="en-US" sz="1400" dirty="0">
+                <a:solidFill>
+                  <a:schemeClr val="tx1"/>
+                </a:solidFill>
+              </a:rPr>
+              <a:t>)</a:t>
+            </a:r>
+          </a:p>
+          <a:p>
+            <a:pPr lvl="1">
               <a:lnSpc>
                 <a:spcPct val="200000"/>
               </a:lnSpc>
-              <a:buNone/>
+              <a:buFont typeface="Wingdings" panose="05000000000000000000" pitchFamily="2" charset="2"/>
+              <a:buChar char="Ø"/>
             </a:pPr>
             <a:r>
               <a:rPr lang="en-US" sz="1400" dirty="0">
@@ -16470,26 +16559,67 @@
                   <a:schemeClr val="tx1"/>
                 </a:solidFill>
               </a:rPr>
-              <a:t> </a:t>
+              <a:t>Selection of the best categorical variable encoding methods (</a:t>
             </a:r>
-          </a:p>
-          <a:p>
-            <a:pPr marL="171450" indent="0">
+            <a:r>
+              <a:rPr lang="en-US" sz="1400" b="1" dirty="0">
+                <a:solidFill>
+                  <a:schemeClr val="tx1"/>
+                </a:solidFill>
+              </a:rPr>
+              <a:t>Mixed Encoding</a:t>
+            </a:r>
+            <a:r>
+              <a:rPr lang="en-US" sz="1400" dirty="0">
+                <a:solidFill>
+                  <a:schemeClr val="tx1"/>
+                </a:solidFill>
+              </a:rPr>
+              <a:t>)</a:t>
+            </a:r>
+          </a:p>
+          <a:p>
+            <a:pPr lvl="1">
               <a:lnSpc>
                 <a:spcPct val="200000"/>
               </a:lnSpc>
-              <a:buNone/>
+              <a:buFont typeface="Wingdings" panose="05000000000000000000" pitchFamily="2" charset="2"/>
+              <a:buChar char="Ø"/>
             </a:pPr>
             <a:r>
+              <a:rPr lang="en-US" sz="1400" dirty="0">
+                <a:solidFill>
+                  <a:schemeClr val="tx1"/>
+                </a:solidFill>
+              </a:rPr>
+              <a:t>Applied the most performant oversampling algorithm and ratio  (</a:t>
+            </a:r>
+            <a:r>
               <a:rPr lang="en-US" sz="1400" b="1" dirty="0">
                 <a:solidFill>
                   <a:schemeClr val="tx1"/>
                 </a:solidFill>
-                <a:sym typeface="Wingdings" panose="05000000000000000000" pitchFamily="2" charset="2"/>
               </a:rPr>
-              <a:t> Choose best performing model</a:t>
+              <a:t>ADASYN</a:t>
             </a:r>
-            <a:endParaRPr lang="en-US" sz="1400" b="1" dirty="0">
+            <a:r>
+              <a:rPr lang="en-US" sz="1400" dirty="0">
+                <a:solidFill>
+                  <a:schemeClr val="tx1"/>
+                </a:solidFill>
+              </a:rPr>
+              <a:t> ratio =1)</a:t>
+            </a:r>
+          </a:p>
+          <a:p>
+            <a:pPr lvl="1">
+              <a:lnSpc>
+                <a:spcPct val="200000"/>
+              </a:lnSpc>
+              <a:buFont typeface="Wingdings" panose="05000000000000000000" pitchFamily="2" charset="2"/>
+              <a:buChar char="Ø"/>
+            </a:pPr>
+            <a:endParaRPr lang="en-US" sz="1400" dirty="0">
               <a:solidFill>
                 <a:schemeClr val="tx1"/>
               </a:solidFill>
@@ -16515,8 +16645,8 @@
         </p:nvSpPr>
         <p:spPr>
           <a:xfrm>
-            <a:off x="344501" y="324690"/>
-            <a:ext cx="3864600" cy="419589"/>
+            <a:off x="363551" y="153240"/>
+            <a:ext cx="3864600" cy="863367"/>
           </a:xfrm>
         </p:spPr>
         <p:txBody>
@@ -16524,14 +16654,14 @@
           <a:lstStyle/>
           <a:p>
             <a:r>
-              <a:rPr lang="en-US" sz="2200" b="1" dirty="0">
+              <a:rPr lang="en-US" b="1" dirty="0">
                 <a:solidFill>
                   <a:schemeClr val="tx1"/>
                 </a:solidFill>
               </a:rPr>
-              <a:t>Selected Model</a:t>
+              <a:t>Optimization of the preprocessing pipeline</a:t>
             </a:r>
-            <a:endParaRPr lang="en-US" sz="2200" b="1" dirty="0">
+            <a:endParaRPr lang="en-US" b="1" dirty="0">
               <a:solidFill>
                 <a:srgbClr val="FF0000"/>
               </a:solidFill>
@@ -16539,10 +16669,97 @@
           </a:p>
         </p:txBody>
       </p:sp>
+      <p:pic>
+        <p:nvPicPr>
+          <p:cNvPr id="2050" name="Picture 2">
+            <a:extLst>
+              <a:ext uri="{FF2B5EF4-FFF2-40B4-BE49-F238E27FC236}">
+                <a16:creationId xmlns:a16="http://schemas.microsoft.com/office/drawing/2014/main" id="{F8BBC463-10EE-08A2-79CF-7DC2A094B698}"/>
+              </a:ext>
+            </a:extLst>
+          </p:cNvPr>
+          <p:cNvPicPr>
+            <a:picLocks noChangeAspect="1" noChangeArrowheads="1"/>
+          </p:cNvPicPr>
+          <p:nvPr/>
+        </p:nvPicPr>
+        <p:blipFill>
+          <a:blip r:embed="rId3">
+            <a:extLst>
+              <a:ext uri="{28A0092B-C50C-407E-A947-70E740481C1C}">
+                <a14:useLocalDpi xmlns:a14="http://schemas.microsoft.com/office/drawing/2010/main" val="0"/>
+              </a:ext>
+            </a:extLst>
+          </a:blip>
+          <a:srcRect/>
+          <a:stretch>
+            <a:fillRect/>
+          </a:stretch>
+        </p:blipFill>
+        <p:spPr bwMode="auto">
+          <a:xfrm>
+            <a:off x="5634129" y="0"/>
+            <a:ext cx="2506662" cy="2571750"/>
+          </a:xfrm>
+          <a:prstGeom prst="rect">
+            <a:avLst/>
+          </a:prstGeom>
+          <a:noFill/>
+          <a:ln>
+            <a:solidFill>
+              <a:schemeClr val="tx1"/>
+            </a:solidFill>
+          </a:ln>
+          <a:extLst>
+            <a:ext uri="{909E8E84-426E-40DD-AFC4-6F175D3DCCD1}">
+              <a14:hiddenFill xmlns:a14="http://schemas.microsoft.com/office/drawing/2010/main">
+                <a:solidFill>
+                  <a:srgbClr val="FFFFFF"/>
+                </a:solidFill>
+              </a14:hiddenFill>
+            </a:ext>
+          </a:extLst>
+        </p:spPr>
+      </p:pic>
+      <p:pic>
+        <p:nvPicPr>
+          <p:cNvPr id="5" name="Picture 4">
+            <a:extLst>
+              <a:ext uri="{FF2B5EF4-FFF2-40B4-BE49-F238E27FC236}">
+                <a16:creationId xmlns:a16="http://schemas.microsoft.com/office/drawing/2014/main" id="{1F3583C4-94B8-22EC-D789-953E88E3DAC9}"/>
+              </a:ext>
+            </a:extLst>
+          </p:cNvPr>
+          <p:cNvPicPr>
+            <a:picLocks noChangeAspect="1"/>
+          </p:cNvPicPr>
+          <p:nvPr/>
+        </p:nvPicPr>
+        <p:blipFill>
+          <a:blip r:embed="rId4"/>
+          <a:stretch>
+            <a:fillRect/>
+          </a:stretch>
+        </p:blipFill>
+        <p:spPr>
+          <a:xfrm>
+            <a:off x="5025777" y="2632999"/>
+            <a:ext cx="3723367" cy="2429226"/>
+          </a:xfrm>
+          <a:prstGeom prst="rect">
+            <a:avLst/>
+          </a:prstGeom>
+          <a:ln>
+            <a:solidFill>
+              <a:schemeClr val="tx1"/>
+            </a:solidFill>
+          </a:ln>
+        </p:spPr>
+      </p:pic>
     </p:spTree>
     <p:extLst>
       <p:ext uri="{BB962C8B-B14F-4D97-AF65-F5344CB8AC3E}">
-        <p14:creationId xmlns:p14="http://schemas.microsoft.com/office/powerpoint/2010/main" val="3335712250"/>
+        <p14:creationId xmlns:p14="http://schemas.microsoft.com/office/powerpoint/2010/main" val="527889704"/>
       </p:ext>
     </p:extLst>
   </p:cSld>
@@ -16587,8 +16804,8 @@
         </p:nvSpPr>
         <p:spPr>
           <a:xfrm>
-            <a:off x="258695" y="895902"/>
-            <a:ext cx="4180778" cy="3820557"/>
+            <a:off x="0" y="800016"/>
+            <a:ext cx="4571999" cy="3820557"/>
           </a:xfrm>
         </p:spPr>
         <p:txBody>
@@ -16606,90 +16823,146 @@
                   <a:schemeClr val="tx1"/>
                 </a:solidFill>
               </a:rPr>
-              <a:t>To improve our model further :</a:t>
+              <a:t>Our selected model and pipeline uses </a:t>
             </a:r>
-          </a:p>
-          <a:p>
-            <a:pPr lvl="1">
-              <a:lnSpc>
-                <a:spcPct val="200000"/>
-              </a:lnSpc>
-              <a:buFont typeface="Wingdings" panose="05000000000000000000" pitchFamily="2" charset="2"/>
-              <a:buChar char="Ø"/>
-            </a:pPr>
+            <a:r>
+              <a:rPr lang="en-US" sz="1400" b="1" dirty="0">
+                <a:solidFill>
+                  <a:schemeClr val="tx1"/>
+                </a:solidFill>
+              </a:rPr>
+              <a:t>the Ridge Classifier </a:t>
+            </a:r>
             <a:r>
               <a:rPr lang="en-US" sz="1400" dirty="0">
                 <a:solidFill>
                   <a:schemeClr val="tx1"/>
                 </a:solidFill>
               </a:rPr>
-              <a:t>Selection of the most efficient scaler</a:t>
+              <a:t>linear algorithm</a:t>
             </a:r>
-          </a:p>
-          <a:p>
-            <a:pPr lvl="1">
-              <a:lnSpc>
-                <a:spcPct val="200000"/>
-              </a:lnSpc>
-              <a:buFont typeface="Wingdings" panose="05000000000000000000" pitchFamily="2" charset="2"/>
-              <a:buChar char="Ø"/>
-            </a:pPr>
             <a:r>
-              <a:rPr lang="en-US" sz="1400" dirty="0">
+              <a:rPr lang="en-US" sz="1400" b="1" dirty="0">
                 <a:solidFill>
                   <a:schemeClr val="tx1"/>
                 </a:solidFill>
               </a:rPr>
-              <a:t>Tested different feature selection methods</a:t>
+              <a:t>.</a:t>
             </a:r>
           </a:p>
           <a:p>
-            <a:pPr lvl="1">
-              <a:lnSpc>
-                <a:spcPct val="200000"/>
-              </a:lnSpc>
-              <a:buFont typeface="Wingdings" panose="05000000000000000000" pitchFamily="2" charset="2"/>
-              <a:buChar char="Ø"/>
-            </a:pPr>
-            <a:r>
-              <a:rPr lang="en-US" sz="1400" dirty="0">
-                <a:solidFill>
-                  <a:schemeClr val="tx1"/>
-                </a:solidFill>
-              </a:rPr>
-              <a:t>Tested different categorical variable encoding methods</a:t>
-            </a:r>
-          </a:p>
-          <a:p>
-            <a:pPr lvl="1">
-              <a:lnSpc>
-                <a:spcPct val="200000"/>
-              </a:lnSpc>
-              <a:buFont typeface="Wingdings" panose="05000000000000000000" pitchFamily="2" charset="2"/>
-              <a:buChar char="Ø"/>
-            </a:pPr>
-            <a:r>
-              <a:rPr lang="en-US" sz="1400" dirty="0">
-                <a:solidFill>
-                  <a:schemeClr val="tx1"/>
-                </a:solidFill>
-              </a:rPr>
-              <a:t>Tested various oversampling ratios and methods</a:t>
-            </a:r>
-          </a:p>
-          <a:p>
-            <a:pPr lvl="1">
-              <a:lnSpc>
-                <a:spcPct val="200000"/>
-              </a:lnSpc>
-              <a:buFont typeface="Wingdings" panose="05000000000000000000" pitchFamily="2" charset="2"/>
-              <a:buChar char="Ø"/>
+            <a:pPr>
+              <a:lnSpc>
+                <a:spcPct val="100000"/>
+              </a:lnSpc>
             </a:pPr>
             <a:endParaRPr lang="en-US" sz="1400" dirty="0">
               <a:solidFill>
                 <a:schemeClr val="tx1"/>
               </a:solidFill>
             </a:endParaRPr>
+          </a:p>
+          <a:p>
+            <a:pPr>
+              <a:lnSpc>
+                <a:spcPct val="200000"/>
+              </a:lnSpc>
+            </a:pPr>
+            <a:r>
+              <a:rPr lang="en-US" sz="1400" b="1" dirty="0">
+                <a:solidFill>
+                  <a:schemeClr val="tx1"/>
+                </a:solidFill>
+              </a:rPr>
+              <a:t>Final ROC AUC Score : 0,76</a:t>
+            </a:r>
+          </a:p>
+          <a:p>
+            <a:pPr>
+              <a:lnSpc>
+                <a:spcPct val="100000"/>
+              </a:lnSpc>
+            </a:pPr>
+            <a:endParaRPr lang="en-US" sz="1400" b="1" dirty="0">
+              <a:solidFill>
+                <a:schemeClr val="tx1"/>
+              </a:solidFill>
+            </a:endParaRPr>
+          </a:p>
+          <a:p>
+            <a:pPr>
+              <a:lnSpc>
+                <a:spcPct val="200000"/>
+              </a:lnSpc>
+            </a:pPr>
+            <a:r>
+              <a:rPr lang="en-US" sz="1400" b="1" dirty="0">
+                <a:solidFill>
+                  <a:schemeClr val="tx1"/>
+                </a:solidFill>
+              </a:rPr>
+              <a:t>Detects 70% of bad borrowers </a:t>
+            </a:r>
+            <a:r>
+              <a:rPr lang="en-US" sz="1400" dirty="0">
+                <a:solidFill>
+                  <a:schemeClr val="tx1"/>
+                </a:solidFill>
+              </a:rPr>
+              <a:t>at the cost of a </a:t>
+            </a:r>
+            <a:r>
+              <a:rPr lang="en-US" sz="1400" b="1" dirty="0">
+                <a:solidFill>
+                  <a:schemeClr val="tx1"/>
+                </a:solidFill>
+              </a:rPr>
+              <a:t>misdetection of 30% of good borrowers</a:t>
+            </a:r>
+          </a:p>
+          <a:p>
+            <a:pPr marL="171450" indent="0">
+              <a:lnSpc>
+                <a:spcPct val="100000"/>
+              </a:lnSpc>
+              <a:buNone/>
+            </a:pPr>
+            <a:endParaRPr lang="en-US" sz="1400" b="1" dirty="0">
+              <a:solidFill>
+                <a:schemeClr val="tx1"/>
+              </a:solidFill>
+            </a:endParaRPr>
+          </a:p>
+          <a:p>
+            <a:pPr>
+              <a:lnSpc>
+                <a:spcPct val="200000"/>
+              </a:lnSpc>
+            </a:pPr>
+            <a:r>
+              <a:rPr lang="en-US" sz="1400" dirty="0">
+                <a:solidFill>
+                  <a:schemeClr val="tx1"/>
+                </a:solidFill>
+              </a:rPr>
+              <a:t>Features with the highest coefficients : extracted from the Credit Card dataset</a:t>
+            </a:r>
+          </a:p>
+          <a:p>
+            <a:pPr marL="171450" indent="0">
+              <a:lnSpc>
+                <a:spcPct val="200000"/>
+              </a:lnSpc>
+              <a:buNone/>
+            </a:pPr>
+            <a:r>
+              <a:rPr lang="en-US" sz="1400" dirty="0">
+                <a:solidFill>
+                  <a:schemeClr val="tx1"/>
+                </a:solidFill>
+              </a:rPr>
+              <a:t> </a:t>
+            </a:r>
           </a:p>
         </p:txBody>
       </p:sp>
@@ -16711,8 +16984,8 @@
         </p:nvSpPr>
         <p:spPr>
           <a:xfrm>
-            <a:off x="363551" y="153240"/>
-            <a:ext cx="3864600" cy="863367"/>
+            <a:off x="344501" y="324690"/>
+            <a:ext cx="3864600" cy="419589"/>
           </a:xfrm>
         </p:spPr>
         <p:txBody>
@@ -16720,14 +16993,14 @@
           <a:lstStyle/>
           <a:p>
             <a:r>
-              <a:rPr lang="en-US" b="1" dirty="0">
+              <a:rPr lang="en-US" sz="2200" b="1" dirty="0">
                 <a:solidFill>
                   <a:schemeClr val="tx1"/>
                 </a:solidFill>
               </a:rPr>
-              <a:t>Optimization of the preprocessing pipeline</a:t>
+              <a:t>Selected Model</a:t>
             </a:r>
-            <a:endParaRPr lang="en-US" b="1" dirty="0">
+            <a:endParaRPr lang="en-US" sz="2200" b="1" dirty="0">
               <a:solidFill>
                 <a:srgbClr val="FF0000"/>
               </a:solidFill>
@@ -16735,10 +17008,97 @@
           </a:p>
         </p:txBody>
       </p:sp>
+      <p:pic>
+        <p:nvPicPr>
+          <p:cNvPr id="3076" name="Picture 4">
+            <a:extLst>
+              <a:ext uri="{FF2B5EF4-FFF2-40B4-BE49-F238E27FC236}">
+                <a16:creationId xmlns:a16="http://schemas.microsoft.com/office/drawing/2014/main" id="{4D519F58-E478-C36F-3DFB-A223B3F02154}"/>
+              </a:ext>
+            </a:extLst>
+          </p:cNvPr>
+          <p:cNvPicPr>
+            <a:picLocks noChangeAspect="1" noChangeArrowheads="1"/>
+          </p:cNvPicPr>
+          <p:nvPr/>
+        </p:nvPicPr>
+        <p:blipFill>
+          <a:blip r:embed="rId3">
+            <a:extLst>
+              <a:ext uri="{28A0092B-C50C-407E-A947-70E740481C1C}">
+                <a14:useLocalDpi xmlns:a14="http://schemas.microsoft.com/office/drawing/2010/main" val="0"/>
+              </a:ext>
+            </a:extLst>
+          </a:blip>
+          <a:srcRect/>
+          <a:stretch>
+            <a:fillRect/>
+          </a:stretch>
+        </p:blipFill>
+        <p:spPr bwMode="auto">
+          <a:xfrm>
+            <a:off x="4571999" y="0"/>
+            <a:ext cx="4572001" cy="3421082"/>
+          </a:xfrm>
+          <a:prstGeom prst="rect">
+            <a:avLst/>
+          </a:prstGeom>
+          <a:noFill/>
+          <a:ln>
+            <a:solidFill>
+              <a:schemeClr val="tx1"/>
+            </a:solidFill>
+          </a:ln>
+          <a:extLst>
+            <a:ext uri="{909E8E84-426E-40DD-AFC4-6F175D3DCCD1}">
+              <a14:hiddenFill xmlns:a14="http://schemas.microsoft.com/office/drawing/2010/main">
+                <a:solidFill>
+                  <a:srgbClr val="FFFFFF"/>
+                </a:solidFill>
+              </a14:hiddenFill>
+            </a:ext>
+          </a:extLst>
+        </p:spPr>
+      </p:pic>
+      <p:pic>
+        <p:nvPicPr>
+          <p:cNvPr id="5" name="Picture 4">
+            <a:extLst>
+              <a:ext uri="{FF2B5EF4-FFF2-40B4-BE49-F238E27FC236}">
+                <a16:creationId xmlns:a16="http://schemas.microsoft.com/office/drawing/2014/main" id="{467F2CB3-F4F1-810A-03F5-AB0DCF9770A3}"/>
+              </a:ext>
+            </a:extLst>
+          </p:cNvPr>
+          <p:cNvPicPr>
+            <a:picLocks noChangeAspect="1"/>
+          </p:cNvPicPr>
+          <p:nvPr/>
+        </p:nvPicPr>
+        <p:blipFill>
+          <a:blip r:embed="rId4"/>
+          <a:stretch>
+            <a:fillRect/>
+          </a:stretch>
+        </p:blipFill>
+        <p:spPr>
+          <a:xfrm>
+            <a:off x="5096848" y="3437731"/>
+            <a:ext cx="3522302" cy="1705769"/>
+          </a:xfrm>
+          <a:prstGeom prst="rect">
+            <a:avLst/>
+          </a:prstGeom>
+          <a:ln>
+            <a:solidFill>
+              <a:schemeClr val="tx1"/>
+            </a:solidFill>
+          </a:ln>
+        </p:spPr>
+      </p:pic>
     </p:spTree>
     <p:extLst>
       <p:ext uri="{BB962C8B-B14F-4D97-AF65-F5344CB8AC3E}">
-        <p14:creationId xmlns:p14="http://schemas.microsoft.com/office/powerpoint/2010/main" val="527889704"/>
+        <p14:creationId xmlns:p14="http://schemas.microsoft.com/office/powerpoint/2010/main" val="3335712250"/>
       </p:ext>
     </p:extLst>
   </p:cSld>
@@ -16876,7 +17236,7 @@
               <a:buChar char="Ø"/>
             </a:pPr>
             <a:r>
-              <a:rPr lang="en-US" sz="1400" b="1" dirty="0">
+              <a:rPr lang="en-US" sz="1400" dirty="0">
                 <a:solidFill>
                   <a:schemeClr val="tx1"/>
                 </a:solidFill>
@@ -16893,7 +17253,7 @@
               <a:buChar char="Ø"/>
             </a:pPr>
             <a:r>
-              <a:rPr lang="en-US" sz="1400" b="1" dirty="0">
+              <a:rPr lang="en-US" sz="1400" dirty="0">
                 <a:solidFill>
                   <a:schemeClr val="tx1"/>
                 </a:solidFill>
@@ -16910,7 +17270,7 @@
               <a:buChar char="Ø"/>
             </a:pPr>
             <a:r>
-              <a:rPr lang="en-US" sz="1400" b="1" dirty="0">
+              <a:rPr lang="en-US" sz="1400" dirty="0">
                 <a:solidFill>
                   <a:schemeClr val="tx1"/>
                 </a:solidFill>
@@ -16927,12 +17287,65 @@
               <a:buChar char="Ø"/>
             </a:pPr>
             <a:r>
-              <a:rPr lang="en-US" sz="1400" b="1" dirty="0">
+              <a:rPr lang="en-US" sz="1400" dirty="0">
                 <a:solidFill>
                   <a:schemeClr val="tx1"/>
                 </a:solidFill>
               </a:rPr>
               <a:t>Avoid bias</a:t>
+            </a:r>
+          </a:p>
+          <a:p>
+            <a:pPr>
+              <a:lnSpc>
+                <a:spcPct val="200000"/>
+              </a:lnSpc>
+              <a:buFont typeface="Arial" panose="020B0604020202020204" pitchFamily="34" charset="0"/>
+              <a:buChar char="•"/>
+            </a:pPr>
+            <a:r>
+              <a:rPr lang="en-US" sz="1400" b="1" dirty="0">
+                <a:solidFill>
+                  <a:schemeClr val="tx1"/>
+                </a:solidFill>
+              </a:rPr>
+              <a:t>Model based on Linear Regression </a:t>
+            </a:r>
+            <a:r>
+              <a:rPr lang="en-US" sz="1400" b="1" dirty="0">
+                <a:solidFill>
+                  <a:schemeClr val="tx1"/>
+                </a:solidFill>
+                <a:sym typeface="Wingdings" panose="05000000000000000000" pitchFamily="2" charset="2"/>
+              </a:rPr>
+              <a:t> Easy to explain</a:t>
+            </a:r>
+          </a:p>
+          <a:p>
+            <a:pPr>
+              <a:lnSpc>
+                <a:spcPct val="200000"/>
+              </a:lnSpc>
+              <a:buFont typeface="Arial" panose="020B0604020202020204" pitchFamily="34" charset="0"/>
+              <a:buChar char="•"/>
+            </a:pPr>
+            <a:r>
+              <a:rPr lang="en-US" sz="1400" dirty="0">
+                <a:solidFill>
+                  <a:schemeClr val="tx1"/>
+                </a:solidFill>
+                <a:sym typeface="Wingdings" panose="05000000000000000000" pitchFamily="2" charset="2"/>
+              </a:rPr>
+              <a:t>Coefficients are provided  </a:t>
+            </a:r>
+            <a:r>
+              <a:rPr lang="en-US" sz="1400" b="1" dirty="0">
+                <a:solidFill>
+                  <a:schemeClr val="tx1"/>
+                </a:solidFill>
+                <a:sym typeface="Wingdings" panose="05000000000000000000" pitchFamily="2" charset="2"/>
+              </a:rPr>
+              <a:t>Easy to figure out which features are important</a:t>
             </a:r>
             <a:endParaRPr lang="en-US" sz="1400" dirty="0">
               <a:solidFill>
@@ -17008,6 +17421,58 @@
           </a:p>
         </p:txBody>
       </p:sp>
+      <p:pic>
+        <p:nvPicPr>
+          <p:cNvPr id="4098" name="Picture 2">
+            <a:extLst>
+              <a:ext uri="{FF2B5EF4-FFF2-40B4-BE49-F238E27FC236}">
+                <a16:creationId xmlns:a16="http://schemas.microsoft.com/office/drawing/2014/main" id="{C398601E-B6DC-93EC-974F-FF7662FC0EB8}"/>
+              </a:ext>
+            </a:extLst>
+          </p:cNvPr>
+          <p:cNvPicPr>
+            <a:picLocks noChangeAspect="1" noChangeArrowheads="1"/>
+          </p:cNvPicPr>
+          <p:nvPr/>
+        </p:nvPicPr>
+        <p:blipFill>
+          <a:blip r:embed="rId3">
+            <a:extLst>
+              <a:ext uri="{28A0092B-C50C-407E-A947-70E740481C1C}">
+                <a14:useLocalDpi xmlns:a14="http://schemas.microsoft.com/office/drawing/2010/main" val="0"/>
+              </a:ext>
+            </a:extLst>
+          </a:blip>
+          <a:srcRect/>
+          <a:stretch>
+            <a:fillRect/>
+          </a:stretch>
+        </p:blipFill>
+        <p:spPr bwMode="auto">
+          <a:xfrm>
+            <a:off x="4572001" y="1095431"/>
+            <a:ext cx="4572000" cy="2931001"/>
+          </a:xfrm>
+          <a:prstGeom prst="rect">
+            <a:avLst/>
+          </a:prstGeom>
+          <a:noFill/>
+          <a:ln>
+            <a:solidFill>
+              <a:schemeClr val="tx1"/>
+            </a:solidFill>
+          </a:ln>
+          <a:extLst>
+            <a:ext uri="{909E8E84-426E-40DD-AFC4-6F175D3DCCD1}">
+              <a14:hiddenFill xmlns:a14="http://schemas.microsoft.com/office/drawing/2010/main">
+                <a:solidFill>
+                  <a:srgbClr val="FFFFFF"/>
+                </a:solidFill>
+              </a14:hiddenFill>
+            </a:ext>
+          </a:extLst>
+        </p:spPr>
+      </p:pic>
     </p:spTree>
     <p:extLst>
       <p:ext uri="{BB962C8B-B14F-4D97-AF65-F5344CB8AC3E}">
@@ -17382,7 +17847,7 @@
                 </a:solidFill>
                 <a:sym typeface="Wingdings" panose="05000000000000000000" pitchFamily="2" charset="2"/>
               </a:rPr>
-              <a:t>In this dataset, </a:t>
+              <a:t>The dataset provided had </a:t>
             </a:r>
             <a:r>
               <a:rPr lang="en-US" sz="1600" b="1" dirty="0">
@@ -17391,14 +17856,72 @@
                 </a:solidFill>
                 <a:sym typeface="Wingdings" panose="05000000000000000000" pitchFamily="2" charset="2"/>
               </a:rPr>
-              <a:t>Sugary Snacks is the most represented category at ~20% </a:t>
+              <a:t>a lot of missing values </a:t>
             </a:r>
+            <a:r>
+              <a:rPr lang="en-US" sz="1600" dirty="0">
+                <a:solidFill>
+                  <a:schemeClr val="tx1"/>
+                </a:solidFill>
+                <a:sym typeface="Wingdings" panose="05000000000000000000" pitchFamily="2" charset="2"/>
+              </a:rPr>
+              <a:t>and a </a:t>
+            </a:r>
+            <a:r>
+              <a:rPr lang="en-US" sz="1600" b="1" dirty="0">
+                <a:solidFill>
+                  <a:schemeClr val="tx1"/>
+                </a:solidFill>
+                <a:sym typeface="Wingdings" panose="05000000000000000000" pitchFamily="2" charset="2"/>
+              </a:rPr>
+              <a:t>significant amount of features</a:t>
+            </a:r>
+            <a:r>
+              <a:rPr lang="en-US" sz="1600" dirty="0">
+                <a:solidFill>
+                  <a:schemeClr val="tx1"/>
+                </a:solidFill>
+                <a:sym typeface="Wingdings" panose="05000000000000000000" pitchFamily="2" charset="2"/>
+              </a:rPr>
+              <a:t>.</a:t>
+            </a:r>
+          </a:p>
+          <a:p>
             <a:endParaRPr lang="en-US" sz="1600" dirty="0">
               <a:solidFill>
                 <a:schemeClr val="tx1"/>
               </a:solidFill>
               <a:sym typeface="Wingdings" panose="05000000000000000000" pitchFamily="2" charset="2"/>
             </a:endParaRPr>
+          </a:p>
+          <a:p>
+            <a:r>
+              <a:rPr lang="en-US" sz="1600" dirty="0">
+                <a:solidFill>
+                  <a:schemeClr val="tx1"/>
+                </a:solidFill>
+                <a:sym typeface="Wingdings" panose="05000000000000000000" pitchFamily="2" charset="2"/>
+              </a:rPr>
+              <a:t>We have built a model using </a:t>
+            </a:r>
+            <a:r>
+              <a:rPr lang="en-US" sz="1600" b="1" dirty="0">
+                <a:solidFill>
+                  <a:schemeClr val="tx1"/>
+                </a:solidFill>
+                <a:sym typeface="Wingdings" panose="05000000000000000000" pitchFamily="2" charset="2"/>
+              </a:rPr>
+              <a:t>Ridge Regression </a:t>
+            </a:r>
+            <a:r>
+              <a:rPr lang="en-US" sz="1600" dirty="0">
+                <a:solidFill>
+                  <a:schemeClr val="tx1"/>
+                </a:solidFill>
+                <a:sym typeface="Wingdings" panose="05000000000000000000" pitchFamily="2" charset="2"/>
+              </a:rPr>
+              <a:t>with this dataset.</a:t>
+            </a:r>
           </a:p>
           <a:p>
             <a:pPr marL="171450" indent="0">
@@ -17419,7 +17942,7 @@
                 </a:solidFill>
                 <a:sym typeface="Wingdings" panose="05000000000000000000" pitchFamily="2" charset="2"/>
               </a:rPr>
-              <a:t>The distribution of Carbohydrates is widely spread </a:t>
+              <a:t>It is an interpretable model</a:t>
             </a:r>
             <a:r>
               <a:rPr lang="en-US" sz="1600" dirty="0">
@@ -17428,7 +17951,7 @@
                 </a:solidFill>
                 <a:sym typeface="Wingdings" panose="05000000000000000000" pitchFamily="2" charset="2"/>
               </a:rPr>
-              <a:t>with a high IQR.</a:t>
+              <a:t> that can be used by non-technical employees.</a:t>
             </a:r>
           </a:p>
           <a:p>
@@ -17447,7 +17970,7 @@
                 </a:solidFill>
                 <a:sym typeface="Wingdings" panose="05000000000000000000" pitchFamily="2" charset="2"/>
               </a:rPr>
-              <a:t>None of the food products variables are normally distributed, and they all have an </a:t>
+              <a:t>The model is able to detect </a:t>
             </a:r>
             <a:r>
               <a:rPr lang="en-US" sz="1600" b="1" dirty="0">
@@ -17456,7 +17979,7 @@
                 </a:solidFill>
                 <a:sym typeface="Wingdings" panose="05000000000000000000" pitchFamily="2" charset="2"/>
               </a:rPr>
-              <a:t>unequal concentration</a:t>
+              <a:t>70% of potential bad borrowers at the cost of 30% of misdetection of good customers.</a:t>
             </a:r>
           </a:p>
           <a:p>
@@ -17475,7 +17998,7 @@
                 </a:solidFill>
                 <a:sym typeface="Wingdings" panose="05000000000000000000" pitchFamily="2" charset="2"/>
               </a:rPr>
-              <a:t>There is a </a:t>
+              <a:t>The </a:t>
             </a:r>
             <a:r>
               <a:rPr lang="en-US" sz="1600" b="1" dirty="0">
@@ -17484,8 +18007,41 @@
                 </a:solidFill>
                 <a:sym typeface="Wingdings" panose="05000000000000000000" pitchFamily="2" charset="2"/>
               </a:rPr>
-              <a:t>strong correlation between Saturated Fat and Nutrition Score</a:t>
+              <a:t>coefficients of each feature </a:t>
             </a:r>
+            <a:r>
+              <a:rPr lang="en-US" sz="1600" dirty="0">
+                <a:solidFill>
+                  <a:schemeClr val="tx1"/>
+                </a:solidFill>
+                <a:sym typeface="Wingdings" panose="05000000000000000000" pitchFamily="2" charset="2"/>
+              </a:rPr>
+              <a:t>can be easily interpreted, the </a:t>
+            </a:r>
+            <a:r>
+              <a:rPr lang="en-US" sz="1600" b="1" dirty="0">
+                <a:solidFill>
+                  <a:schemeClr val="tx1"/>
+                </a:solidFill>
+                <a:sym typeface="Wingdings" panose="05000000000000000000" pitchFamily="2" charset="2"/>
+              </a:rPr>
+              <a:t>most useful dataset is the credit card balance data</a:t>
+            </a:r>
+            <a:r>
+              <a:rPr lang="en-US" sz="1600" dirty="0">
+                <a:solidFill>
+                  <a:schemeClr val="tx1"/>
+                </a:solidFill>
+                <a:sym typeface="Wingdings" panose="05000000000000000000" pitchFamily="2" charset="2"/>
+              </a:rPr>
+              <a:t>.</a:t>
+            </a:r>
+            <a:endParaRPr lang="en-US" sz="1600" b="1" dirty="0">
+              <a:solidFill>
+                <a:schemeClr val="tx1"/>
+              </a:solidFill>
+              <a:sym typeface="Wingdings" panose="05000000000000000000" pitchFamily="2" charset="2"/>
+            </a:endParaRPr>
           </a:p>
           <a:p>
             <a:endParaRPr lang="en-US" sz="1600" dirty="0">
@@ -17503,18 +18059,8 @@
                 </a:solidFill>
                 <a:sym typeface="Wingdings" panose="05000000000000000000" pitchFamily="2" charset="2"/>
               </a:rPr>
-              <a:t>The average nutrition score of new entries is increasing over time  New products are less healthy</a:t>
+              <a:t>This model could be improved by </a:t>
             </a:r>
-          </a:p>
-          <a:p>
-            <a:endParaRPr lang="en-US" dirty="0">
-              <a:solidFill>
-                <a:schemeClr val="tx1"/>
-              </a:solidFill>
-              <a:sym typeface="Wingdings" panose="05000000000000000000" pitchFamily="2" charset="2"/>
-            </a:endParaRPr>
-          </a:p>
-          <a:p>
             <a:r>
               <a:rPr lang="en-US" sz="1600" b="1" dirty="0">
                 <a:solidFill>
@@ -17522,7 +18068,7 @@
                 </a:solidFill>
                 <a:sym typeface="Wingdings" panose="05000000000000000000" pitchFamily="2" charset="2"/>
               </a:rPr>
-              <a:t>The number of additives with palm oil is decreasing over time  </a:t>
+              <a:t>changing the model with a less interpretable algorithm</a:t>
             </a:r>
             <a:r>
               <a:rPr lang="en-US" sz="1600" dirty="0">
@@ -17531,18 +18077,17 @@
                 </a:solidFill>
                 <a:sym typeface="Wingdings" panose="05000000000000000000" pitchFamily="2" charset="2"/>
               </a:rPr>
-              <a:t>The campaign against the use of palm oil is working</a:t>
+              <a:t>.</a:t>
             </a:r>
-          </a:p>
-          <a:p>
-            <a:endParaRPr lang="en-US" sz="1600" dirty="0">
-              <a:solidFill>
-                <a:schemeClr val="tx1"/>
-              </a:solidFill>
-              <a:sym typeface="Wingdings" panose="05000000000000000000" pitchFamily="2" charset="2"/>
-            </a:endParaRPr>
-          </a:p>
-          <a:p>
+            <a:r>
+              <a:rPr lang="en-US" sz="1600" b="1" dirty="0">
+                <a:solidFill>
+                  <a:schemeClr val="tx1"/>
+                </a:solidFill>
+                <a:sym typeface="Wingdings" panose="05000000000000000000" pitchFamily="2" charset="2"/>
+              </a:rPr>
+              <a:t> </a:t>
+            </a:r>
             <a:endParaRPr lang="en-US" sz="1600" dirty="0">
               <a:solidFill>
                 <a:schemeClr val="tx1"/>
@@ -21104,7 +21649,23 @@
                   <a:schemeClr val="tx1"/>
                 </a:solidFill>
               </a:rPr>
-              <a:t>4 methods :</a:t>
+              <a:t>4 methods </a:t>
+            </a:r>
+            <a:r>
+              <a:rPr lang="en-US" sz="1600" dirty="0">
+                <a:solidFill>
+                  <a:schemeClr val="tx1"/>
+                </a:solidFill>
+              </a:rPr>
+              <a:t>have been tested </a:t>
+            </a:r>
+            <a:r>
+              <a:rPr lang="en-US" sz="1600" b="1" dirty="0">
+                <a:solidFill>
+                  <a:schemeClr val="tx1"/>
+                </a:solidFill>
+              </a:rPr>
+              <a:t>:</a:t>
             </a:r>
           </a:p>
           <a:p>
@@ -21126,7 +21687,7 @@
                   <a:schemeClr val="tx1"/>
                 </a:solidFill>
               </a:rPr>
-              <a:t>: Remove features with low variance (and thus predictive power)</a:t>
+              <a:t>: Remove features with low variance (low predictive power)</a:t>
             </a:r>
           </a:p>
           <a:p>
@@ -21222,7 +21783,7 @@
             <a:r>
               <a:rPr lang="en-US" sz="1600" b="1" dirty="0">
                 <a:solidFill>
-                  <a:schemeClr val="tx1"/>
+                  <a:srgbClr val="FF0000"/>
                 </a:solidFill>
               </a:rPr>
               <a:t>Boruta algorithm: </a:t>

</xml_diff>